<commit_message>
Deployed 3443826 with MkDocs version: 1.5.3
</commit_message>
<xml_diff>
--- a/slides/Week2_Recap.pptx
+++ b/slides/Week2_Recap.pptx
@@ -193,6 +193,7 @@
 <p1510:revInfo xmlns:a="http://schemas.openxmlformats.org/drawingml/2006/main" xmlns:r="http://schemas.openxmlformats.org/officeDocument/2006/relationships" xmlns:p1510="http://schemas.microsoft.com/office/powerpoint/2015/10/main">
   <p1510:revLst>
     <p1510:client id="{134297E3-9E91-42FF-B8F2-DE56B7AAC032}" v="722" dt="2025-01-27T05:00:35.276"/>
+    <p1510:client id="{558B2C84-57D9-440A-8E3C-89A7F4320226}" v="56" dt="2025-01-28T01:32:48.797"/>
     <p1510:client id="{F752FD5D-5EE2-451C-AE67-F656D015BA51}" v="570" dt="2025-01-27T08:41:19.037"/>
   </p1510:revLst>
 </p1510:revInfo>
@@ -227,6 +228,61 @@
           <pc:docMk/>
           <pc:sldMk cId="2072030558" sldId="547"/>
         </pc:sldMkLst>
+      </pc:sldChg>
+    </pc:docChg>
+  </pc:docChgLst>
+  <pc:docChgLst>
+    <pc:chgData name="Zhao Jin" userId="cd05a825-544c-438a-9ba1-08e63db50b47" providerId="ADAL" clId="{558B2C84-57D9-440A-8E3C-89A7F4320226}"/>
+    <pc:docChg chg="undo custSel modSld">
+      <pc:chgData name="Zhao Jin" userId="cd05a825-544c-438a-9ba1-08e63db50b47" providerId="ADAL" clId="{558B2C84-57D9-440A-8E3C-89A7F4320226}" dt="2025-01-28T01:32:50.603" v="80" actId="1076"/>
+      <pc:docMkLst>
+        <pc:docMk/>
+      </pc:docMkLst>
+      <pc:sldChg chg="modSp mod modAnim">
+        <pc:chgData name="Zhao Jin" userId="cd05a825-544c-438a-9ba1-08e63db50b47" providerId="ADAL" clId="{558B2C84-57D9-440A-8E3C-89A7F4320226}" dt="2025-01-28T01:31:26.801" v="68" actId="1076"/>
+        <pc:sldMkLst>
+          <pc:docMk/>
+          <pc:sldMk cId="3023700246" sldId="545"/>
+        </pc:sldMkLst>
+        <pc:spChg chg="mod">
+          <ac:chgData name="Zhao Jin" userId="cd05a825-544c-438a-9ba1-08e63db50b47" providerId="ADAL" clId="{558B2C84-57D9-440A-8E3C-89A7F4320226}" dt="2025-01-28T01:31:26.801" v="68" actId="1076"/>
+          <ac:spMkLst>
+            <pc:docMk/>
+            <pc:sldMk cId="3023700246" sldId="545"/>
+            <ac:spMk id="2" creationId="{8CC7D46F-A931-F17E-6BC1-B2325DD7E5B5}"/>
+          </ac:spMkLst>
+        </pc:spChg>
+      </pc:sldChg>
+      <pc:sldChg chg="modSp mod">
+        <pc:chgData name="Zhao Jin" userId="cd05a825-544c-438a-9ba1-08e63db50b47" providerId="ADAL" clId="{558B2C84-57D9-440A-8E3C-89A7F4320226}" dt="2025-01-28T01:32:50.603" v="80" actId="1076"/>
+        <pc:sldMkLst>
+          <pc:docMk/>
+          <pc:sldMk cId="1777826333" sldId="546"/>
+        </pc:sldMkLst>
+        <pc:spChg chg="mod">
+          <ac:chgData name="Zhao Jin" userId="cd05a825-544c-438a-9ba1-08e63db50b47" providerId="ADAL" clId="{558B2C84-57D9-440A-8E3C-89A7F4320226}" dt="2025-01-28T01:32:45.318" v="76" actId="1076"/>
+          <ac:spMkLst>
+            <pc:docMk/>
+            <pc:sldMk cId="1777826333" sldId="546"/>
+            <ac:spMk id="2" creationId="{81A09875-B89E-4841-3097-0202AA5C78C1}"/>
+          </ac:spMkLst>
+        </pc:spChg>
+        <pc:spChg chg="mod">
+          <ac:chgData name="Zhao Jin" userId="cd05a825-544c-438a-9ba1-08e63db50b47" providerId="ADAL" clId="{558B2C84-57D9-440A-8E3C-89A7F4320226}" dt="2025-01-28T01:32:50.603" v="80" actId="1076"/>
+          <ac:spMkLst>
+            <pc:docMk/>
+            <pc:sldMk cId="1777826333" sldId="546"/>
+            <ac:spMk id="5" creationId="{E2261A87-1539-9F2D-6B31-E35092E1D6DD}"/>
+          </ac:spMkLst>
+        </pc:spChg>
+        <pc:spChg chg="mod">
+          <ac:chgData name="Zhao Jin" userId="cd05a825-544c-438a-9ba1-08e63db50b47" providerId="ADAL" clId="{558B2C84-57D9-440A-8E3C-89A7F4320226}" dt="2025-01-28T01:32:48.797" v="79" actId="20577"/>
+          <ac:spMkLst>
+            <pc:docMk/>
+            <pc:sldMk cId="1777826333" sldId="546"/>
+            <ac:spMk id="10" creationId="{00000000-0000-0000-0000-000000000000}"/>
+          </ac:spMkLst>
+        </pc:spChg>
       </pc:sldChg>
     </pc:docChg>
   </pc:docChgLst>
@@ -2328,7 +2384,7 @@
               <a:pPr>
                 <a:defRPr/>
               </a:pPr>
-              <a:t>1/27/2025</a:t>
+              <a:t>1/28/2025</a:t>
             </a:fld>
             <a:endParaRPr lang="en-US"/>
           </a:p>
@@ -16595,7 +16651,7 @@
                             </p:stCondLst>
                             <p:childTnLst>
                               <p:par>
-                                <p:cTn id="17" presetID="1" presetClass="entr" presetSubtype="0" fill="hold" nodeType="clickEffect">
+                                <p:cTn id="17" presetID="1" presetClass="exit" presetSubtype="0" fill="hold" grpId="0" nodeType="clickEffect">
                                   <p:stCondLst>
                                     <p:cond delay="0"/>
                                   </p:stCondLst>
@@ -16603,55 +16659,6 @@
                                     <p:set>
                                       <p:cBhvr>
                                         <p:cTn id="18" dur="1" fill="hold">
-                                          <p:stCondLst>
-                                            <p:cond delay="0"/>
-                                          </p:stCondLst>
-                                        </p:cTn>
-                                        <p:tgtEl>
-                                          <p:spTgt spid="10">
-                                            <p:txEl>
-                                              <p:pRg st="7" end="7"/>
-                                            </p:txEl>
-                                          </p:spTgt>
-                                        </p:tgtEl>
-                                        <p:attrNameLst>
-                                          <p:attrName>style.visibility</p:attrName>
-                                        </p:attrNameLst>
-                                      </p:cBhvr>
-                                      <p:to>
-                                        <p:strVal val="visible"/>
-                                      </p:to>
-                                    </p:set>
-                                  </p:childTnLst>
-                                </p:cTn>
-                              </p:par>
-                            </p:childTnLst>
-                          </p:cTn>
-                        </p:par>
-                      </p:childTnLst>
-                    </p:cTn>
-                  </p:par>
-                  <p:par>
-                    <p:cTn id="19" fill="hold">
-                      <p:stCondLst>
-                        <p:cond delay="indefinite"/>
-                      </p:stCondLst>
-                      <p:childTnLst>
-                        <p:par>
-                          <p:cTn id="20" fill="hold">
-                            <p:stCondLst>
-                              <p:cond delay="0"/>
-                            </p:stCondLst>
-                            <p:childTnLst>
-                              <p:par>
-                                <p:cTn id="21" presetID="1" presetClass="exit" presetSubtype="0" fill="hold" grpId="0" nodeType="clickEffect">
-                                  <p:stCondLst>
-                                    <p:cond delay="0"/>
-                                  </p:stCondLst>
-                                  <p:childTnLst>
-                                    <p:set>
-                                      <p:cBhvr>
-                                        <p:cTn id="22" dur="1" fill="hold">
                                           <p:stCondLst>
                                             <p:cond delay="0"/>
                                           </p:stCondLst>
@@ -17800,7 +17807,7 @@
             </a:br>
             <a:r>
               <a:rPr lang="en-US" sz="2000" i="1" dirty="0"/>
-              <a:t>(CS1010 I/O Lib.) </a:t>
+              <a:t>(Function from CS1010 I/O Lib.) </a:t>
             </a:r>
           </a:p>
           <a:p>
@@ -17827,7 +17834,7 @@
             </a:br>
             <a:r>
               <a:rPr lang="en-US" sz="2000" i="1" dirty="0"/>
-              <a:t>(CS1010 I/O  Lib.)</a:t>
+              <a:t>(Function from CS1010 I/O Lib.)</a:t>
             </a:r>
             <a:endParaRPr lang="en-US" sz="2400" i="1" dirty="0"/>
           </a:p>
@@ -18012,8 +18019,8 @@
         </p:nvSpPr>
         <p:spPr>
           <a:xfrm>
-            <a:off x="1758696" y="5065776"/>
-            <a:ext cx="2133600" cy="356616"/>
+            <a:off x="1722120" y="5100542"/>
+            <a:ext cx="3974592" cy="356616"/>
           </a:xfrm>
           <a:prstGeom prst="rect">
             <a:avLst/>
@@ -18064,8 +18071,8 @@
         </p:nvSpPr>
         <p:spPr>
           <a:xfrm>
-            <a:off x="1758696" y="5821680"/>
-            <a:ext cx="2133600" cy="356616"/>
+            <a:off x="1722120" y="5820156"/>
+            <a:ext cx="4120896" cy="356616"/>
           </a:xfrm>
           <a:prstGeom prst="rect">
             <a:avLst/>

</xml_diff>